<commit_message>
Added Student Responses to lab6 pptx
</commit_message>
<xml_diff>
--- a/public/pdfs/lab6slides.pptx
+++ b/public/pdfs/lab6slides.pptx
@@ -29662,15 +29662,108 @@
                   <a:srgbClr val="FF0000"/>
                 </a:solidFill>
               </a:rPr>
-              <a:t>W</a:t>
-            </a:r>
-            <a:r>
-              <a:rPr lang="en" sz="1800" dirty="0">
+              <a:t>Easier than you thought (Actually </a:t>
+            </a:r>
+            <a:r>
+              <a:rPr lang="en-US" sz="1800" dirty="0" err="1">
                 <a:solidFill>
                   <a:srgbClr val="FF0000"/>
                 </a:solidFill>
               </a:rPr>
-              <a:t>rite stuff down cam…</a:t>
+              <a:t>kinda</a:t>
+            </a:r>
+            <a:r>
+              <a:rPr lang="en-US" sz="1800" dirty="0">
+                <a:solidFill>
+                  <a:srgbClr val="FF0000"/>
+                </a:solidFill>
+              </a:rPr>
+              <a:t> hard)</a:t>
+            </a:r>
+          </a:p>
+          <a:p>
+            <a:pPr marL="914400" marR="0" lvl="1" indent="-342900" algn="l" rtl="0">
+              <a:lnSpc>
+                <a:spcPct val="115000"/>
+              </a:lnSpc>
+              <a:spcBef>
+                <a:spcPts val="0"/>
+              </a:spcBef>
+              <a:spcAft>
+                <a:spcPts val="0"/>
+              </a:spcAft>
+              <a:buSzPts val="1800"/>
+              <a:buChar char="○"/>
+            </a:pPr>
+            <a:r>
+              <a:rPr lang="en-US" sz="1800" dirty="0">
+                <a:solidFill>
+                  <a:srgbClr val="FF0000"/>
+                </a:solidFill>
+              </a:rPr>
+              <a:t>Last question </a:t>
+            </a:r>
+            <a:r>
+              <a:rPr lang="en-US" sz="1800">
+                <a:solidFill>
+                  <a:srgbClr val="FF0000"/>
+                </a:solidFill>
+              </a:rPr>
+              <a:t>was hard Thanos</a:t>
+            </a:r>
+            <a:r>
+              <a:rPr lang="en-US" sz="1800" dirty="0">
+                <a:solidFill>
+                  <a:srgbClr val="FF0000"/>
+                </a:solidFill>
+              </a:rPr>
+              <a:t> kills half of CS 61A</a:t>
+            </a:r>
+          </a:p>
+          <a:p>
+            <a:pPr marL="914400" marR="0" lvl="1" indent="-342900" algn="l" rtl="0">
+              <a:lnSpc>
+                <a:spcPct val="115000"/>
+              </a:lnSpc>
+              <a:spcBef>
+                <a:spcPts val="0"/>
+              </a:spcBef>
+              <a:spcAft>
+                <a:spcPts val="0"/>
+              </a:spcAft>
+              <a:buSzPts val="1800"/>
+              <a:buChar char="○"/>
+            </a:pPr>
+            <a:r>
+              <a:rPr lang="en-US" sz="1800" dirty="0">
+                <a:solidFill>
+                  <a:srgbClr val="FF0000"/>
+                </a:solidFill>
+              </a:rPr>
+              <a:t>What’s a messenger function? Wtf (FB Messenger)</a:t>
+            </a:r>
+          </a:p>
+          <a:p>
+            <a:pPr marL="914400" marR="0" lvl="1" indent="-342900" algn="l" rtl="0">
+              <a:lnSpc>
+                <a:spcPct val="115000"/>
+              </a:lnSpc>
+              <a:spcBef>
+                <a:spcPts val="0"/>
+              </a:spcBef>
+              <a:spcAft>
+                <a:spcPts val="0"/>
+              </a:spcAft>
+              <a:buSzPts val="1800"/>
+              <a:buChar char="○"/>
+            </a:pPr>
+            <a:r>
+              <a:rPr lang="en-US" sz="1800" dirty="0">
+                <a:solidFill>
+                  <a:srgbClr val="FF0000"/>
+                </a:solidFill>
+              </a:rPr>
+              <a:t>Environment Diagram was rough stuff</a:t>
             </a:r>
             <a:endParaRPr sz="1800" dirty="0">
               <a:solidFill>
@@ -45830,79 +45923,66 @@
               <a:rPr lang="en" sz="1800" dirty="0"/>
               <a:t>Why are we learning a new language?</a:t>
             </a:r>
-            <a:endParaRPr sz="1800" dirty="0"/>
-          </a:p>
-          <a:p>
-            <a:pPr marL="914400" marR="0" lvl="1" indent="-342900" algn="l" rtl="0">
-              <a:lnSpc>
-                <a:spcPct val="115000"/>
-              </a:lnSpc>
-              <a:spcBef>
-                <a:spcPts val="0"/>
-              </a:spcBef>
-              <a:spcAft>
-                <a:spcPts val="0"/>
-              </a:spcAft>
-              <a:buClr>
-                <a:srgbClr val="FF0000"/>
-              </a:buClr>
+          </a:p>
+          <a:p>
+            <a:pPr lvl="1" indent="-342900">
+              <a:spcBef>
+                <a:spcPts val="0"/>
+              </a:spcBef>
               <a:buSzPts val="1800"/>
-              <a:buChar char="○"/>
+              <a:buChar char="●"/>
             </a:pPr>
             <a:r>
-              <a:rPr lang="en" sz="1800" dirty="0">
-                <a:solidFill>
-                  <a:srgbClr val="FF0000"/>
-                </a:solidFill>
-              </a:rPr>
-              <a:t>&lt;Cameron, write responses here omg </a:t>
-            </a:r>
-            <a:r>
-              <a:rPr lang="en" sz="1800" dirty="0" err="1">
-                <a:solidFill>
-                  <a:srgbClr val="FF0000"/>
-                </a:solidFill>
-              </a:rPr>
-              <a:t>rememberrr</a:t>
-            </a:r>
-            <a:r>
-              <a:rPr lang="en" sz="1800" dirty="0">
-                <a:solidFill>
-                  <a:srgbClr val="FF0000"/>
-                </a:solidFill>
-              </a:rPr>
-              <a:t>&gt;</a:t>
-            </a:r>
-            <a:endParaRPr sz="1800" dirty="0">
-              <a:solidFill>
-                <a:srgbClr val="FF0000"/>
-              </a:solidFill>
-            </a:endParaRPr>
-          </a:p>
-          <a:p>
-            <a:pPr marL="914400" marR="0" lvl="1" indent="-342900" algn="l" rtl="0">
-              <a:lnSpc>
-                <a:spcPct val="115000"/>
-              </a:lnSpc>
-              <a:spcBef>
-                <a:spcPts val="0"/>
-              </a:spcBef>
-              <a:spcAft>
-                <a:spcPts val="0"/>
-              </a:spcAft>
-              <a:buClr>
-                <a:srgbClr val="FF0000"/>
-              </a:buClr>
+              <a:rPr lang="en" sz="1600" dirty="0"/>
+              <a:t>Apply stuff we already learned to other languages</a:t>
+            </a:r>
+          </a:p>
+          <a:p>
+            <a:pPr lvl="1" indent="-342900">
+              <a:spcBef>
+                <a:spcPts val="0"/>
+              </a:spcBef>
               <a:buSzPts val="1800"/>
-              <a:buChar char="○"/>
+              <a:buChar char="●"/>
             </a:pPr>
             <a:r>
-              <a:rPr lang="en" sz="1800" dirty="0">
-                <a:solidFill>
-                  <a:srgbClr val="FF0000"/>
-                </a:solidFill>
-              </a:rPr>
-              <a:t>^^^ Also turn the color back to black...</a:t>
+              <a:rPr lang="en" sz="1600" dirty="0"/>
+              <a:t>Get used to transfer brains to different languages</a:t>
+            </a:r>
+          </a:p>
+          <a:p>
+            <a:pPr lvl="2" indent="-342900">
+              <a:spcBef>
+                <a:spcPts val="0"/>
+              </a:spcBef>
+              <a:buSzPts val="1800"/>
+              <a:buChar char="●"/>
+            </a:pPr>
+            <a:r>
+              <a:rPr lang="en" sz="1600" dirty="0"/>
+              <a:t>Learn to </a:t>
+            </a:r>
+            <a:r>
+              <a:rPr lang="en-US" sz="1600" dirty="0"/>
+              <a:t>E</a:t>
+            </a:r>
+            <a:r>
+              <a:rPr lang="en" sz="1600" dirty="0" err="1"/>
+              <a:t>nglish</a:t>
+            </a:r>
+            <a:endParaRPr lang="en" sz="1600" dirty="0"/>
+          </a:p>
+          <a:p>
+            <a:pPr lvl="1" indent="-342900">
+              <a:spcBef>
+                <a:spcPts val="0"/>
+              </a:spcBef>
+              <a:buSzPts val="1800"/>
+              <a:buChar char="●"/>
+            </a:pPr>
+            <a:r>
+              <a:rPr lang="en" sz="1600" dirty="0"/>
+              <a:t>Learn how interpreters work</a:t>
             </a:r>
           </a:p>
         </p:txBody>

</xml_diff>